<commit_message>
UserPortal added, websocket traffic implemented
</commit_message>
<xml_diff>
--- a/Microservices_schema.pptx
+++ b/Microservices_schema.pptx
@@ -6,6 +6,7 @@
   </p:sldMasterIdLst>
   <p:sldIdLst>
     <p:sldId id="256" r:id="rId2"/>
+    <p:sldId id="257" r:id="rId3"/>
   </p:sldIdLst>
   <p:sldSz cx="12192000" cy="6858000"/>
   <p:notesSz cx="6858000" cy="9144000"/>
@@ -104,6 +105,11 @@
       </a:defRPr>
     </a:lvl9pPr>
   </p:defaultTextStyle>
+  <p:extLst>
+    <p:ext uri="{EFAFB233-063F-42B5-8137-9DF3F51BA10A}">
+      <p15:sldGuideLst xmlns:p15="http://schemas.microsoft.com/office/powerpoint/2012/main"/>
+    </p:ext>
+  </p:extLst>
 </p:presentation>
 </file>
 
@@ -256,7 +262,7 @@
           <a:p>
             <a:fld id="{0F862E04-129F-4891-9605-C631F7CCB0C5}" type="datetimeFigureOut">
               <a:rPr lang="ru-RU" smtClean="0"/>
-              <a:t>04.07.2022</a:t>
+              <a:t>12.07.2022</a:t>
             </a:fld>
             <a:endParaRPr lang="ru-RU"/>
           </a:p>
@@ -456,7 +462,7 @@
           <a:p>
             <a:fld id="{0F862E04-129F-4891-9605-C631F7CCB0C5}" type="datetimeFigureOut">
               <a:rPr lang="ru-RU" smtClean="0"/>
-              <a:t>04.07.2022</a:t>
+              <a:t>12.07.2022</a:t>
             </a:fld>
             <a:endParaRPr lang="ru-RU"/>
           </a:p>
@@ -666,7 +672,7 @@
           <a:p>
             <a:fld id="{0F862E04-129F-4891-9605-C631F7CCB0C5}" type="datetimeFigureOut">
               <a:rPr lang="ru-RU" smtClean="0"/>
-              <a:t>04.07.2022</a:t>
+              <a:t>12.07.2022</a:t>
             </a:fld>
             <a:endParaRPr lang="ru-RU"/>
           </a:p>
@@ -866,7 +872,7 @@
           <a:p>
             <a:fld id="{0F862E04-129F-4891-9605-C631F7CCB0C5}" type="datetimeFigureOut">
               <a:rPr lang="ru-RU" smtClean="0"/>
-              <a:t>04.07.2022</a:t>
+              <a:t>12.07.2022</a:t>
             </a:fld>
             <a:endParaRPr lang="ru-RU"/>
           </a:p>
@@ -1142,7 +1148,7 @@
           <a:p>
             <a:fld id="{0F862E04-129F-4891-9605-C631F7CCB0C5}" type="datetimeFigureOut">
               <a:rPr lang="ru-RU" smtClean="0"/>
-              <a:t>04.07.2022</a:t>
+              <a:t>12.07.2022</a:t>
             </a:fld>
             <a:endParaRPr lang="ru-RU"/>
           </a:p>
@@ -1410,7 +1416,7 @@
           <a:p>
             <a:fld id="{0F862E04-129F-4891-9605-C631F7CCB0C5}" type="datetimeFigureOut">
               <a:rPr lang="ru-RU" smtClean="0"/>
-              <a:t>04.07.2022</a:t>
+              <a:t>12.07.2022</a:t>
             </a:fld>
             <a:endParaRPr lang="ru-RU"/>
           </a:p>
@@ -1825,7 +1831,7 @@
           <a:p>
             <a:fld id="{0F862E04-129F-4891-9605-C631F7CCB0C5}" type="datetimeFigureOut">
               <a:rPr lang="ru-RU" smtClean="0"/>
-              <a:t>04.07.2022</a:t>
+              <a:t>12.07.2022</a:t>
             </a:fld>
             <a:endParaRPr lang="ru-RU"/>
           </a:p>
@@ -1967,7 +1973,7 @@
           <a:p>
             <a:fld id="{0F862E04-129F-4891-9605-C631F7CCB0C5}" type="datetimeFigureOut">
               <a:rPr lang="ru-RU" smtClean="0"/>
-              <a:t>04.07.2022</a:t>
+              <a:t>12.07.2022</a:t>
             </a:fld>
             <a:endParaRPr lang="ru-RU"/>
           </a:p>
@@ -2080,7 +2086,7 @@
           <a:p>
             <a:fld id="{0F862E04-129F-4891-9605-C631F7CCB0C5}" type="datetimeFigureOut">
               <a:rPr lang="ru-RU" smtClean="0"/>
-              <a:t>04.07.2022</a:t>
+              <a:t>12.07.2022</a:t>
             </a:fld>
             <a:endParaRPr lang="ru-RU"/>
           </a:p>
@@ -2393,7 +2399,7 @@
           <a:p>
             <a:fld id="{0F862E04-129F-4891-9605-C631F7CCB0C5}" type="datetimeFigureOut">
               <a:rPr lang="ru-RU" smtClean="0"/>
-              <a:t>04.07.2022</a:t>
+              <a:t>12.07.2022</a:t>
             </a:fld>
             <a:endParaRPr lang="ru-RU"/>
           </a:p>
@@ -2682,7 +2688,7 @@
           <a:p>
             <a:fld id="{0F862E04-129F-4891-9605-C631F7CCB0C5}" type="datetimeFigureOut">
               <a:rPr lang="ru-RU" smtClean="0"/>
-              <a:t>04.07.2022</a:t>
+              <a:t>12.07.2022</a:t>
             </a:fld>
             <a:endParaRPr lang="ru-RU"/>
           </a:p>
@@ -2925,7 +2931,7 @@
           <a:p>
             <a:fld id="{0F862E04-129F-4891-9605-C631F7CCB0C5}" type="datetimeFigureOut">
               <a:rPr lang="ru-RU" smtClean="0"/>
-              <a:t>04.07.2022</a:t>
+              <a:t>12.07.2022</a:t>
             </a:fld>
             <a:endParaRPr lang="ru-RU"/>
           </a:p>
@@ -4142,6 +4148,306 @@
 </p:sld>
 </file>
 
+<file path=ppt/slides/slide2.xml><?xml version="1.0" encoding="utf-8"?>
+<p:sld xmlns:a="http://schemas.openxmlformats.org/drawingml/2006/main" xmlns:r="http://schemas.openxmlformats.org/officeDocument/2006/relationships" xmlns:p="http://schemas.openxmlformats.org/presentationml/2006/main">
+  <p:cSld>
+    <p:spTree>
+      <p:nvGrpSpPr>
+        <p:cNvPr id="1" name=""/>
+        <p:cNvGrpSpPr/>
+        <p:nvPr/>
+      </p:nvGrpSpPr>
+      <p:grpSpPr>
+        <a:xfrm>
+          <a:off x="0" y="0"/>
+          <a:ext cx="0" cy="0"/>
+          <a:chOff x="0" y="0"/>
+          <a:chExt cx="0" cy="0"/>
+        </a:xfrm>
+      </p:grpSpPr>
+      <p:sp>
+        <p:nvSpPr>
+          <p:cNvPr id="5" name="TextBox 4">
+            <a:extLst>
+              <a:ext uri="{FF2B5EF4-FFF2-40B4-BE49-F238E27FC236}">
+                <a16:creationId xmlns:a16="http://schemas.microsoft.com/office/drawing/2014/main" id="{9C4631B3-9DA7-FF17-0FA6-1E83F4728124}"/>
+              </a:ext>
+            </a:extLst>
+          </p:cNvPr>
+          <p:cNvSpPr txBox="1"/>
+          <p:nvPr/>
+        </p:nvSpPr>
+        <p:spPr>
+          <a:xfrm>
+            <a:off x="1464815" y="1091953"/>
+            <a:ext cx="2636668" cy="369332"/>
+          </a:xfrm>
+          <a:prstGeom prst="rect">
+            <a:avLst/>
+          </a:prstGeom>
+          <a:noFill/>
+          <a:ln>
+            <a:solidFill>
+              <a:schemeClr val="tx1"/>
+            </a:solidFill>
+          </a:ln>
+        </p:spPr>
+        <p:txBody>
+          <a:bodyPr wrap="square" rtlCol="0">
+            <a:spAutoFit/>
+          </a:bodyPr>
+          <a:lstStyle/>
+          <a:p>
+            <a:r>
+              <a:rPr lang="en-US" dirty="0" err="1"/>
+              <a:t>HistorcalService</a:t>
+            </a:r>
+            <a:endParaRPr lang="ru-RU" dirty="0"/>
+          </a:p>
+        </p:txBody>
+      </p:sp>
+      <p:sp>
+        <p:nvSpPr>
+          <p:cNvPr id="6" name="TextBox 5">
+            <a:extLst>
+              <a:ext uri="{FF2B5EF4-FFF2-40B4-BE49-F238E27FC236}">
+                <a16:creationId xmlns:a16="http://schemas.microsoft.com/office/drawing/2014/main" id="{6381F38E-7DF7-20C7-A9EC-963666D55F1D}"/>
+              </a:ext>
+            </a:extLst>
+          </p:cNvPr>
+          <p:cNvSpPr txBox="1"/>
+          <p:nvPr/>
+        </p:nvSpPr>
+        <p:spPr>
+          <a:xfrm>
+            <a:off x="2302437" y="2370338"/>
+            <a:ext cx="1293020" cy="369332"/>
+          </a:xfrm>
+          <a:prstGeom prst="rect">
+            <a:avLst/>
+          </a:prstGeom>
+          <a:noFill/>
+        </p:spPr>
+        <p:txBody>
+          <a:bodyPr wrap="square" rtlCol="0">
+            <a:spAutoFit/>
+          </a:bodyPr>
+          <a:lstStyle/>
+          <a:p>
+            <a:r>
+              <a:rPr lang="en-US" dirty="0" err="1"/>
+              <a:t>UserPortal</a:t>
+            </a:r>
+            <a:endParaRPr lang="ru-RU" dirty="0"/>
+          </a:p>
+        </p:txBody>
+      </p:sp>
+      <p:sp>
+        <p:nvSpPr>
+          <p:cNvPr id="7" name="TextBox 6">
+            <a:extLst>
+              <a:ext uri="{FF2B5EF4-FFF2-40B4-BE49-F238E27FC236}">
+                <a16:creationId xmlns:a16="http://schemas.microsoft.com/office/drawing/2014/main" id="{05F372B6-284C-F6A2-B0C0-2C4384ABE87A}"/>
+              </a:ext>
+            </a:extLst>
+          </p:cNvPr>
+          <p:cNvSpPr txBox="1"/>
+          <p:nvPr/>
+        </p:nvSpPr>
+        <p:spPr>
+          <a:xfrm>
+            <a:off x="3790765" y="2086252"/>
+            <a:ext cx="1420427" cy="369332"/>
+          </a:xfrm>
+          <a:prstGeom prst="rect">
+            <a:avLst/>
+          </a:prstGeom>
+          <a:noFill/>
+        </p:spPr>
+        <p:txBody>
+          <a:bodyPr wrap="square" rtlCol="0">
+            <a:spAutoFit/>
+          </a:bodyPr>
+          <a:lstStyle/>
+          <a:p>
+            <a:r>
+              <a:rPr lang="en-US" dirty="0"/>
+              <a:t>WebSocket</a:t>
+            </a:r>
+            <a:endParaRPr lang="ru-RU" dirty="0"/>
+          </a:p>
+        </p:txBody>
+      </p:sp>
+      <p:sp>
+        <p:nvSpPr>
+          <p:cNvPr id="8" name="TextBox 7">
+            <a:extLst>
+              <a:ext uri="{FF2B5EF4-FFF2-40B4-BE49-F238E27FC236}">
+                <a16:creationId xmlns:a16="http://schemas.microsoft.com/office/drawing/2014/main" id="{9A37D499-BC54-359B-510B-D96AC053FB24}"/>
+              </a:ext>
+            </a:extLst>
+          </p:cNvPr>
+          <p:cNvSpPr txBox="1"/>
+          <p:nvPr/>
+        </p:nvSpPr>
+        <p:spPr>
+          <a:xfrm>
+            <a:off x="4975933" y="2370338"/>
+            <a:ext cx="1806607" cy="369332"/>
+          </a:xfrm>
+          <a:prstGeom prst="rect">
+            <a:avLst/>
+          </a:prstGeom>
+          <a:noFill/>
+        </p:spPr>
+        <p:txBody>
+          <a:bodyPr wrap="square" rtlCol="0">
+            <a:spAutoFit/>
+          </a:bodyPr>
+          <a:lstStyle/>
+          <a:p>
+            <a:r>
+              <a:rPr lang="en-US" dirty="0"/>
+              <a:t>HTML5 web page</a:t>
+            </a:r>
+            <a:endParaRPr lang="ru-RU" dirty="0"/>
+          </a:p>
+        </p:txBody>
+      </p:sp>
+      <p:cxnSp>
+        <p:nvCxnSpPr>
+          <p:cNvPr id="13" name="Straight Arrow Connector 12">
+            <a:extLst>
+              <a:ext uri="{FF2B5EF4-FFF2-40B4-BE49-F238E27FC236}">
+                <a16:creationId xmlns:a16="http://schemas.microsoft.com/office/drawing/2014/main" id="{8F7B3352-BB0C-105D-E770-3A7B89A09AC1}"/>
+              </a:ext>
+            </a:extLst>
+          </p:cNvPr>
+          <p:cNvCxnSpPr>
+            <a:cxnSpLocks/>
+            <a:stCxn id="8" idx="1"/>
+            <a:endCxn id="6" idx="3"/>
+          </p:cNvCxnSpPr>
+          <p:nvPr/>
+        </p:nvCxnSpPr>
+        <p:spPr>
+          <a:xfrm flipH="1">
+            <a:off x="3595457" y="2555004"/>
+            <a:ext cx="1380476" cy="0"/>
+          </a:xfrm>
+          <a:prstGeom prst="straightConnector1">
+            <a:avLst/>
+          </a:prstGeom>
+          <a:ln>
+            <a:tailEnd type="triangle"/>
+          </a:ln>
+        </p:spPr>
+        <p:style>
+          <a:lnRef idx="1">
+            <a:schemeClr val="accent1"/>
+          </a:lnRef>
+          <a:fillRef idx="0">
+            <a:schemeClr val="accent1"/>
+          </a:fillRef>
+          <a:effectRef idx="0">
+            <a:schemeClr val="accent1"/>
+          </a:effectRef>
+          <a:fontRef idx="minor">
+            <a:schemeClr val="tx1"/>
+          </a:fontRef>
+        </p:style>
+      </p:cxnSp>
+      <p:cxnSp>
+        <p:nvCxnSpPr>
+          <p:cNvPr id="15" name="Straight Arrow Connector 14">
+            <a:extLst>
+              <a:ext uri="{FF2B5EF4-FFF2-40B4-BE49-F238E27FC236}">
+                <a16:creationId xmlns:a16="http://schemas.microsoft.com/office/drawing/2014/main" id="{14B6410F-DE37-FD48-B02B-CA15F259F228}"/>
+              </a:ext>
+            </a:extLst>
+          </p:cNvPr>
+          <p:cNvCxnSpPr>
+            <a:cxnSpLocks/>
+            <a:stCxn id="6" idx="0"/>
+          </p:cNvCxnSpPr>
+          <p:nvPr/>
+        </p:nvCxnSpPr>
+        <p:spPr>
+          <a:xfrm flipH="1" flipV="1">
+            <a:off x="2938508" y="1597981"/>
+            <a:ext cx="10439" cy="772357"/>
+          </a:xfrm>
+          <a:prstGeom prst="straightConnector1">
+            <a:avLst/>
+          </a:prstGeom>
+          <a:ln>
+            <a:tailEnd type="triangle"/>
+          </a:ln>
+        </p:spPr>
+        <p:style>
+          <a:lnRef idx="1">
+            <a:schemeClr val="accent1"/>
+          </a:lnRef>
+          <a:fillRef idx="0">
+            <a:schemeClr val="accent1"/>
+          </a:fillRef>
+          <a:effectRef idx="0">
+            <a:schemeClr val="accent1"/>
+          </a:effectRef>
+          <a:fontRef idx="minor">
+            <a:schemeClr val="tx1"/>
+          </a:fontRef>
+        </p:style>
+      </p:cxnSp>
+      <p:sp>
+        <p:nvSpPr>
+          <p:cNvPr id="16" name="TextBox 15">
+            <a:extLst>
+              <a:ext uri="{FF2B5EF4-FFF2-40B4-BE49-F238E27FC236}">
+                <a16:creationId xmlns:a16="http://schemas.microsoft.com/office/drawing/2014/main" id="{074C4B7E-0F6F-8076-C518-DF4A1684E825}"/>
+              </a:ext>
+            </a:extLst>
+          </p:cNvPr>
+          <p:cNvSpPr txBox="1"/>
+          <p:nvPr/>
+        </p:nvSpPr>
+        <p:spPr>
+          <a:xfrm>
+            <a:off x="2302436" y="1817249"/>
+            <a:ext cx="636072" cy="369332"/>
+          </a:xfrm>
+          <a:prstGeom prst="rect">
+            <a:avLst/>
+          </a:prstGeom>
+          <a:noFill/>
+        </p:spPr>
+        <p:txBody>
+          <a:bodyPr wrap="none" rtlCol="0">
+            <a:spAutoFit/>
+          </a:bodyPr>
+          <a:lstStyle/>
+          <a:p>
+            <a:r>
+              <a:rPr lang="en-US" dirty="0"/>
+              <a:t>REST</a:t>
+            </a:r>
+            <a:endParaRPr lang="ru-RU" dirty="0"/>
+          </a:p>
+        </p:txBody>
+      </p:sp>
+    </p:spTree>
+    <p:extLst>
+      <p:ext uri="{BB962C8B-B14F-4D97-AF65-F5344CB8AC3E}">
+        <p14:creationId xmlns:p14="http://schemas.microsoft.com/office/powerpoint/2010/main" val="255370958"/>
+      </p:ext>
+    </p:extLst>
+  </p:cSld>
+  <p:clrMapOvr>
+    <a:masterClrMapping/>
+  </p:clrMapOvr>
+</p:sld>
+</file>
+
 <file path=ppt/theme/theme1.xml><?xml version="1.0" encoding="utf-8"?>
 <a:theme xmlns:a="http://schemas.openxmlformats.org/drawingml/2006/main" name="Office Theme">
   <a:themeElements>

</xml_diff>

<commit_message>
Auth Service initial implementation
</commit_message>
<xml_diff>
--- a/Microservices_schema.pptx
+++ b/Microservices_schema.pptx
@@ -262,7 +262,7 @@
           <a:p>
             <a:fld id="{0F862E04-129F-4891-9605-C631F7CCB0C5}" type="datetimeFigureOut">
               <a:rPr lang="ru-RU" smtClean="0"/>
-              <a:t>12.07.2022</a:t>
+              <a:t>18.07.2022</a:t>
             </a:fld>
             <a:endParaRPr lang="ru-RU"/>
           </a:p>
@@ -462,7 +462,7 @@
           <a:p>
             <a:fld id="{0F862E04-129F-4891-9605-C631F7CCB0C5}" type="datetimeFigureOut">
               <a:rPr lang="ru-RU" smtClean="0"/>
-              <a:t>12.07.2022</a:t>
+              <a:t>18.07.2022</a:t>
             </a:fld>
             <a:endParaRPr lang="ru-RU"/>
           </a:p>
@@ -672,7 +672,7 @@
           <a:p>
             <a:fld id="{0F862E04-129F-4891-9605-C631F7CCB0C5}" type="datetimeFigureOut">
               <a:rPr lang="ru-RU" smtClean="0"/>
-              <a:t>12.07.2022</a:t>
+              <a:t>18.07.2022</a:t>
             </a:fld>
             <a:endParaRPr lang="ru-RU"/>
           </a:p>
@@ -872,7 +872,7 @@
           <a:p>
             <a:fld id="{0F862E04-129F-4891-9605-C631F7CCB0C5}" type="datetimeFigureOut">
               <a:rPr lang="ru-RU" smtClean="0"/>
-              <a:t>12.07.2022</a:t>
+              <a:t>18.07.2022</a:t>
             </a:fld>
             <a:endParaRPr lang="ru-RU"/>
           </a:p>
@@ -1148,7 +1148,7 @@
           <a:p>
             <a:fld id="{0F862E04-129F-4891-9605-C631F7CCB0C5}" type="datetimeFigureOut">
               <a:rPr lang="ru-RU" smtClean="0"/>
-              <a:t>12.07.2022</a:t>
+              <a:t>18.07.2022</a:t>
             </a:fld>
             <a:endParaRPr lang="ru-RU"/>
           </a:p>
@@ -1416,7 +1416,7 @@
           <a:p>
             <a:fld id="{0F862E04-129F-4891-9605-C631F7CCB0C5}" type="datetimeFigureOut">
               <a:rPr lang="ru-RU" smtClean="0"/>
-              <a:t>12.07.2022</a:t>
+              <a:t>18.07.2022</a:t>
             </a:fld>
             <a:endParaRPr lang="ru-RU"/>
           </a:p>
@@ -1831,7 +1831,7 @@
           <a:p>
             <a:fld id="{0F862E04-129F-4891-9605-C631F7CCB0C5}" type="datetimeFigureOut">
               <a:rPr lang="ru-RU" smtClean="0"/>
-              <a:t>12.07.2022</a:t>
+              <a:t>18.07.2022</a:t>
             </a:fld>
             <a:endParaRPr lang="ru-RU"/>
           </a:p>
@@ -1973,7 +1973,7 @@
           <a:p>
             <a:fld id="{0F862E04-129F-4891-9605-C631F7CCB0C5}" type="datetimeFigureOut">
               <a:rPr lang="ru-RU" smtClean="0"/>
-              <a:t>12.07.2022</a:t>
+              <a:t>18.07.2022</a:t>
             </a:fld>
             <a:endParaRPr lang="ru-RU"/>
           </a:p>
@@ -2086,7 +2086,7 @@
           <a:p>
             <a:fld id="{0F862E04-129F-4891-9605-C631F7CCB0C5}" type="datetimeFigureOut">
               <a:rPr lang="ru-RU" smtClean="0"/>
-              <a:t>12.07.2022</a:t>
+              <a:t>18.07.2022</a:t>
             </a:fld>
             <a:endParaRPr lang="ru-RU"/>
           </a:p>
@@ -2399,7 +2399,7 @@
           <a:p>
             <a:fld id="{0F862E04-129F-4891-9605-C631F7CCB0C5}" type="datetimeFigureOut">
               <a:rPr lang="ru-RU" smtClean="0"/>
-              <a:t>12.07.2022</a:t>
+              <a:t>18.07.2022</a:t>
             </a:fld>
             <a:endParaRPr lang="ru-RU"/>
           </a:p>
@@ -2688,7 +2688,7 @@
           <a:p>
             <a:fld id="{0F862E04-129F-4891-9605-C631F7CCB0C5}" type="datetimeFigureOut">
               <a:rPr lang="ru-RU" smtClean="0"/>
-              <a:t>12.07.2022</a:t>
+              <a:t>18.07.2022</a:t>
             </a:fld>
             <a:endParaRPr lang="ru-RU"/>
           </a:p>
@@ -2931,7 +2931,7 @@
           <a:p>
             <a:fld id="{0F862E04-129F-4891-9605-C631F7CCB0C5}" type="datetimeFigureOut">
               <a:rPr lang="ru-RU" smtClean="0"/>
-              <a:t>12.07.2022</a:t>
+              <a:t>18.07.2022</a:t>
             </a:fld>
             <a:endParaRPr lang="ru-RU"/>
           </a:p>
@@ -3410,7 +3410,7 @@
         </p:nvSpPr>
         <p:spPr>
           <a:xfrm>
-            <a:off x="176168" y="578840"/>
+            <a:off x="176168" y="666925"/>
             <a:ext cx="1921079" cy="847288"/>
           </a:xfrm>
           <a:prstGeom prst="cloud">
@@ -3688,7 +3688,7 @@
         </p:nvSpPr>
         <p:spPr>
           <a:xfrm>
-            <a:off x="2957118" y="2899791"/>
+            <a:off x="2957118" y="2899789"/>
             <a:ext cx="1245765" cy="1233183"/>
           </a:xfrm>
           <a:prstGeom prst="rect">
@@ -3733,13 +3733,14 @@
           </p:cNvPr>
           <p:cNvCxnSpPr>
             <a:cxnSpLocks/>
+            <a:endCxn id="8" idx="2"/>
           </p:cNvCxnSpPr>
           <p:nvPr/>
         </p:nvCxnSpPr>
         <p:spPr>
           <a:xfrm flipV="1">
-            <a:off x="3586290" y="2023142"/>
-            <a:ext cx="0" cy="876649"/>
+            <a:off x="3586290" y="2042718"/>
+            <a:ext cx="2243360" cy="857073"/>
           </a:xfrm>
           <a:prstGeom prst="straightConnector1">
             <a:avLst/>
@@ -3806,7 +3807,14 @@
             <a:pPr algn="ctr"/>
             <a:r>
               <a:rPr lang="en-US" dirty="0"/>
-              <a:t>Web Server</a:t>
+              <a:t>User Portal</a:t>
+            </a:r>
+          </a:p>
+          <a:p>
+            <a:pPr algn="ctr"/>
+            <a:r>
+              <a:rPr lang="en-US" dirty="0"/>
+              <a:t>(Web)</a:t>
             </a:r>
             <a:endParaRPr lang="ru-RU" dirty="0"/>
           </a:p>
@@ -3814,24 +3822,22 @@
       </p:sp>
       <p:cxnSp>
         <p:nvCxnSpPr>
-          <p:cNvPr id="19" name="Straight Arrow Connector 18">
-            <a:extLst>
-              <a:ext uri="{FF2B5EF4-FFF2-40B4-BE49-F238E27FC236}">
-                <a16:creationId xmlns:a16="http://schemas.microsoft.com/office/drawing/2014/main" id="{4E9A69E2-B04C-9EF7-51FB-F94EEBBCE63C}"/>
+          <p:cNvPr id="23" name="Straight Arrow Connector 22">
+            <a:extLst>
+              <a:ext uri="{FF2B5EF4-FFF2-40B4-BE49-F238E27FC236}">
+                <a16:creationId xmlns:a16="http://schemas.microsoft.com/office/drawing/2014/main" id="{A6B23570-C895-4C59-C27C-13F2820C8E2A}"/>
               </a:ext>
             </a:extLst>
           </p:cNvPr>
           <p:cNvCxnSpPr>
             <a:cxnSpLocks/>
-            <a:stCxn id="4" idx="2"/>
-            <a:endCxn id="18" idx="0"/>
           </p:cNvCxnSpPr>
           <p:nvPr/>
         </p:nvCxnSpPr>
         <p:spPr>
-          <a:xfrm>
-            <a:off x="3580002" y="2042719"/>
-            <a:ext cx="2249648" cy="857072"/>
+          <a:xfrm flipV="1">
+            <a:off x="5829649" y="2023141"/>
+            <a:ext cx="0" cy="876649"/>
           </a:xfrm>
           <a:prstGeom prst="straightConnector1">
             <a:avLst/>
@@ -3856,24 +3862,121 @@
           </a:fontRef>
         </p:style>
       </p:cxnSp>
+      <p:sp>
+        <p:nvSpPr>
+          <p:cNvPr id="24" name="Rectangle 23">
+            <a:extLst>
+              <a:ext uri="{FF2B5EF4-FFF2-40B4-BE49-F238E27FC236}">
+                <a16:creationId xmlns:a16="http://schemas.microsoft.com/office/drawing/2014/main" id="{808C9941-35CD-BDAB-1E53-23D51D0B6EA5}"/>
+              </a:ext>
+            </a:extLst>
+          </p:cNvPr>
+          <p:cNvSpPr/>
+          <p:nvPr/>
+        </p:nvSpPr>
+        <p:spPr>
+          <a:xfrm>
+            <a:off x="7370430" y="2899790"/>
+            <a:ext cx="1325461" cy="746621"/>
+          </a:xfrm>
+          <a:prstGeom prst="rect">
+            <a:avLst/>
+          </a:prstGeom>
+        </p:spPr>
+        <p:style>
+          <a:lnRef idx="2">
+            <a:schemeClr val="accent2"/>
+          </a:lnRef>
+          <a:fillRef idx="1">
+            <a:schemeClr val="lt1"/>
+          </a:fillRef>
+          <a:effectRef idx="0">
+            <a:schemeClr val="accent2"/>
+          </a:effectRef>
+          <a:fontRef idx="minor">
+            <a:schemeClr val="dk1"/>
+          </a:fontRef>
+        </p:style>
+        <p:txBody>
+          <a:bodyPr rtlCol="0" anchor="ctr"/>
+          <a:lstStyle/>
+          <a:p>
+            <a:pPr algn="ctr"/>
+            <a:r>
+              <a:rPr lang="en-US" dirty="0"/>
+              <a:t>Account Service</a:t>
+            </a:r>
+            <a:endParaRPr lang="ru-RU" dirty="0"/>
+          </a:p>
+        </p:txBody>
+      </p:sp>
+      <p:sp>
+        <p:nvSpPr>
+          <p:cNvPr id="25" name="Cylinder 24">
+            <a:extLst>
+              <a:ext uri="{FF2B5EF4-FFF2-40B4-BE49-F238E27FC236}">
+                <a16:creationId xmlns:a16="http://schemas.microsoft.com/office/drawing/2014/main" id="{5A404F0F-6389-DCED-66B9-DAE0B942D879}"/>
+              </a:ext>
+            </a:extLst>
+          </p:cNvPr>
+          <p:cNvSpPr/>
+          <p:nvPr/>
+        </p:nvSpPr>
+        <p:spPr>
+          <a:xfrm>
+            <a:off x="9318773" y="3143071"/>
+            <a:ext cx="1090569" cy="746620"/>
+          </a:xfrm>
+          <a:prstGeom prst="can">
+            <a:avLst/>
+          </a:prstGeom>
+        </p:spPr>
+        <p:style>
+          <a:lnRef idx="2">
+            <a:schemeClr val="accent2"/>
+          </a:lnRef>
+          <a:fillRef idx="1">
+            <a:schemeClr val="lt1"/>
+          </a:fillRef>
+          <a:effectRef idx="0">
+            <a:schemeClr val="accent2"/>
+          </a:effectRef>
+          <a:fontRef idx="minor">
+            <a:schemeClr val="dk1"/>
+          </a:fontRef>
+        </p:style>
+        <p:txBody>
+          <a:bodyPr rtlCol="0" anchor="ctr"/>
+          <a:lstStyle/>
+          <a:p>
+            <a:pPr algn="ctr"/>
+            <a:r>
+              <a:rPr lang="en-US" dirty="0"/>
+              <a:t>DB</a:t>
+            </a:r>
+            <a:endParaRPr lang="ru-RU" dirty="0"/>
+          </a:p>
+        </p:txBody>
+      </p:sp>
       <p:cxnSp>
         <p:nvCxnSpPr>
-          <p:cNvPr id="23" name="Straight Arrow Connector 22">
-            <a:extLst>
-              <a:ext uri="{FF2B5EF4-FFF2-40B4-BE49-F238E27FC236}">
-                <a16:creationId xmlns:a16="http://schemas.microsoft.com/office/drawing/2014/main" id="{A6B23570-C895-4C59-C27C-13F2820C8E2A}"/>
+          <p:cNvPr id="26" name="Straight Arrow Connector 25">
+            <a:extLst>
+              <a:ext uri="{FF2B5EF4-FFF2-40B4-BE49-F238E27FC236}">
+                <a16:creationId xmlns:a16="http://schemas.microsoft.com/office/drawing/2014/main" id="{702A2639-17D8-457B-0E6C-F4C57E3C8AC9}"/>
               </a:ext>
             </a:extLst>
           </p:cNvPr>
           <p:cNvCxnSpPr>
             <a:cxnSpLocks/>
+            <a:endCxn id="25" idx="2"/>
           </p:cNvCxnSpPr>
           <p:nvPr/>
         </p:nvCxnSpPr>
         <p:spPr>
-          <a:xfrm flipV="1">
-            <a:off x="5829649" y="2023141"/>
-            <a:ext cx="0" cy="876649"/>
+          <a:xfrm>
+            <a:off x="8695891" y="3516381"/>
+            <a:ext cx="622882" cy="0"/>
           </a:xfrm>
           <a:prstGeom prst="straightConnector1">
             <a:avLst/>
@@ -3900,10 +4003,10 @@
       </p:cxnSp>
       <p:sp>
         <p:nvSpPr>
-          <p:cNvPr id="24" name="Rectangle 23">
-            <a:extLst>
-              <a:ext uri="{FF2B5EF4-FFF2-40B4-BE49-F238E27FC236}">
-                <a16:creationId xmlns:a16="http://schemas.microsoft.com/office/drawing/2014/main" id="{808C9941-35CD-BDAB-1E53-23D51D0B6EA5}"/>
+          <p:cNvPr id="28" name="Rectangle 27">
+            <a:extLst>
+              <a:ext uri="{FF2B5EF4-FFF2-40B4-BE49-F238E27FC236}">
+                <a16:creationId xmlns:a16="http://schemas.microsoft.com/office/drawing/2014/main" id="{EAF08A7F-FD2D-6F4C-38A9-9A126A24F2BA}"/>
               </a:ext>
             </a:extLst>
           </p:cNvPr>
@@ -3912,8 +4015,8 @@
         </p:nvSpPr>
         <p:spPr>
           <a:xfrm>
-            <a:off x="7338968" y="2899790"/>
-            <a:ext cx="1325461" cy="746621"/>
+            <a:off x="7370430" y="3646411"/>
+            <a:ext cx="1325461" cy="486563"/>
           </a:xfrm>
           <a:prstGeom prst="rect">
             <a:avLst/>
@@ -3939,145 +4042,6 @@
           <a:p>
             <a:pPr algn="ctr"/>
             <a:r>
-              <a:rPr lang="en-US" dirty="0"/>
-              <a:t>Account Service</a:t>
-            </a:r>
-            <a:endParaRPr lang="ru-RU" dirty="0"/>
-          </a:p>
-        </p:txBody>
-      </p:sp>
-      <p:sp>
-        <p:nvSpPr>
-          <p:cNvPr id="25" name="Cylinder 24">
-            <a:extLst>
-              <a:ext uri="{FF2B5EF4-FFF2-40B4-BE49-F238E27FC236}">
-                <a16:creationId xmlns:a16="http://schemas.microsoft.com/office/drawing/2014/main" id="{5A404F0F-6389-DCED-66B9-DAE0B942D879}"/>
-              </a:ext>
-            </a:extLst>
-          </p:cNvPr>
-          <p:cNvSpPr/>
-          <p:nvPr/>
-        </p:nvSpPr>
-        <p:spPr>
-          <a:xfrm>
-            <a:off x="9234882" y="3143071"/>
-            <a:ext cx="1090569" cy="746620"/>
-          </a:xfrm>
-          <a:prstGeom prst="can">
-            <a:avLst/>
-          </a:prstGeom>
-        </p:spPr>
-        <p:style>
-          <a:lnRef idx="2">
-            <a:schemeClr val="accent2"/>
-          </a:lnRef>
-          <a:fillRef idx="1">
-            <a:schemeClr val="lt1"/>
-          </a:fillRef>
-          <a:effectRef idx="0">
-            <a:schemeClr val="accent2"/>
-          </a:effectRef>
-          <a:fontRef idx="minor">
-            <a:schemeClr val="dk1"/>
-          </a:fontRef>
-        </p:style>
-        <p:txBody>
-          <a:bodyPr rtlCol="0" anchor="ctr"/>
-          <a:lstStyle/>
-          <a:p>
-            <a:pPr algn="ctr"/>
-            <a:r>
-              <a:rPr lang="en-US" dirty="0"/>
-              <a:t>DB</a:t>
-            </a:r>
-            <a:endParaRPr lang="ru-RU" dirty="0"/>
-          </a:p>
-        </p:txBody>
-      </p:sp>
-      <p:cxnSp>
-        <p:nvCxnSpPr>
-          <p:cNvPr id="26" name="Straight Arrow Connector 25">
-            <a:extLst>
-              <a:ext uri="{FF2B5EF4-FFF2-40B4-BE49-F238E27FC236}">
-                <a16:creationId xmlns:a16="http://schemas.microsoft.com/office/drawing/2014/main" id="{702A2639-17D8-457B-0E6C-F4C57E3C8AC9}"/>
-              </a:ext>
-            </a:extLst>
-          </p:cNvPr>
-          <p:cNvCxnSpPr>
-            <a:cxnSpLocks/>
-            <a:endCxn id="25" idx="2"/>
-          </p:cNvCxnSpPr>
-          <p:nvPr/>
-        </p:nvCxnSpPr>
-        <p:spPr>
-          <a:xfrm flipV="1">
-            <a:off x="8664429" y="3516381"/>
-            <a:ext cx="570453" cy="1"/>
-          </a:xfrm>
-          <a:prstGeom prst="straightConnector1">
-            <a:avLst/>
-          </a:prstGeom>
-          <a:ln>
-            <a:headEnd type="triangle"/>
-            <a:tailEnd type="triangle"/>
-          </a:ln>
-        </p:spPr>
-        <p:style>
-          <a:lnRef idx="1">
-            <a:schemeClr val="accent1"/>
-          </a:lnRef>
-          <a:fillRef idx="0">
-            <a:schemeClr val="accent1"/>
-          </a:fillRef>
-          <a:effectRef idx="0">
-            <a:schemeClr val="accent1"/>
-          </a:effectRef>
-          <a:fontRef idx="minor">
-            <a:schemeClr val="tx1"/>
-          </a:fontRef>
-        </p:style>
-      </p:cxnSp>
-      <p:sp>
-        <p:nvSpPr>
-          <p:cNvPr id="28" name="Rectangle 27">
-            <a:extLst>
-              <a:ext uri="{FF2B5EF4-FFF2-40B4-BE49-F238E27FC236}">
-                <a16:creationId xmlns:a16="http://schemas.microsoft.com/office/drawing/2014/main" id="{EAF08A7F-FD2D-6F4C-38A9-9A126A24F2BA}"/>
-              </a:ext>
-            </a:extLst>
-          </p:cNvPr>
-          <p:cNvSpPr/>
-          <p:nvPr/>
-        </p:nvSpPr>
-        <p:spPr>
-          <a:xfrm>
-            <a:off x="7338968" y="3646411"/>
-            <a:ext cx="1325461" cy="457199"/>
-          </a:xfrm>
-          <a:prstGeom prst="rect">
-            <a:avLst/>
-          </a:prstGeom>
-        </p:spPr>
-        <p:style>
-          <a:lnRef idx="2">
-            <a:schemeClr val="accent2"/>
-          </a:lnRef>
-          <a:fillRef idx="1">
-            <a:schemeClr val="lt1"/>
-          </a:fillRef>
-          <a:effectRef idx="0">
-            <a:schemeClr val="accent2"/>
-          </a:effectRef>
-          <a:fontRef idx="minor">
-            <a:schemeClr val="dk1"/>
-          </a:fontRef>
-        </p:style>
-        <p:txBody>
-          <a:bodyPr rtlCol="0" anchor="ctr"/>
-          <a:lstStyle/>
-          <a:p>
-            <a:pPr algn="ctr"/>
-            <a:r>
               <a:rPr lang="en-US" sz="1400" dirty="0"/>
               <a:t>Authentication and Security</a:t>
             </a:r>
@@ -4099,8 +4063,8 @@
         </p:nvSpPr>
         <p:spPr>
           <a:xfrm>
-            <a:off x="469782" y="3054716"/>
-            <a:ext cx="1837190" cy="1200329"/>
+            <a:off x="660979" y="3054716"/>
+            <a:ext cx="1837190" cy="923330"/>
           </a:xfrm>
           <a:prstGeom prst="rect">
             <a:avLst/>
@@ -4129,9 +4093,187 @@
               <a:rPr lang="en-US" dirty="0"/>
               <a:t>Logging</a:t>
             </a:r>
-          </a:p>
-          <a:p>
             <a:endParaRPr lang="ru-RU" dirty="0"/>
+          </a:p>
+        </p:txBody>
+      </p:sp>
+      <p:sp>
+        <p:nvSpPr>
+          <p:cNvPr id="2" name="TextBox 1">
+            <a:extLst>
+              <a:ext uri="{FF2B5EF4-FFF2-40B4-BE49-F238E27FC236}">
+                <a16:creationId xmlns:a16="http://schemas.microsoft.com/office/drawing/2014/main" id="{15639902-5E3C-97BD-A2F3-CB2C5DC41C45}"/>
+              </a:ext>
+            </a:extLst>
+          </p:cNvPr>
+          <p:cNvSpPr txBox="1"/>
+          <p:nvPr/>
+        </p:nvSpPr>
+        <p:spPr>
+          <a:xfrm>
+            <a:off x="3177679" y="3871362"/>
+            <a:ext cx="1098957" cy="261610"/>
+          </a:xfrm>
+          <a:prstGeom prst="rect">
+            <a:avLst/>
+          </a:prstGeom>
+          <a:noFill/>
+        </p:spPr>
+        <p:txBody>
+          <a:bodyPr wrap="square" rtlCol="0">
+            <a:spAutoFit/>
+          </a:bodyPr>
+          <a:lstStyle/>
+          <a:p>
+            <a:r>
+              <a:rPr lang="en-US" sz="1100" dirty="0"/>
+              <a:t>Port: 8002</a:t>
+            </a:r>
+            <a:endParaRPr lang="ru-RU" sz="1100" dirty="0"/>
+          </a:p>
+        </p:txBody>
+      </p:sp>
+      <p:sp>
+        <p:nvSpPr>
+          <p:cNvPr id="19" name="TextBox 18">
+            <a:extLst>
+              <a:ext uri="{FF2B5EF4-FFF2-40B4-BE49-F238E27FC236}">
+                <a16:creationId xmlns:a16="http://schemas.microsoft.com/office/drawing/2014/main" id="{A12ACD39-9C85-1554-D505-3BB16AB3830C}"/>
+              </a:ext>
+            </a:extLst>
+          </p:cNvPr>
+          <p:cNvSpPr txBox="1"/>
+          <p:nvPr/>
+        </p:nvSpPr>
+        <p:spPr>
+          <a:xfrm>
+            <a:off x="7704588" y="4164358"/>
+            <a:ext cx="1098957" cy="261610"/>
+          </a:xfrm>
+          <a:prstGeom prst="rect">
+            <a:avLst/>
+          </a:prstGeom>
+          <a:noFill/>
+        </p:spPr>
+        <p:txBody>
+          <a:bodyPr wrap="square" rtlCol="0">
+            <a:spAutoFit/>
+          </a:bodyPr>
+          <a:lstStyle/>
+          <a:p>
+            <a:r>
+              <a:rPr lang="en-US" sz="1100" dirty="0"/>
+              <a:t>Port: 8001</a:t>
+            </a:r>
+            <a:endParaRPr lang="ru-RU" sz="1100" dirty="0"/>
+          </a:p>
+        </p:txBody>
+      </p:sp>
+      <p:sp>
+        <p:nvSpPr>
+          <p:cNvPr id="20" name="TextBox 19">
+            <a:extLst>
+              <a:ext uri="{FF2B5EF4-FFF2-40B4-BE49-F238E27FC236}">
+                <a16:creationId xmlns:a16="http://schemas.microsoft.com/office/drawing/2014/main" id="{A5F77A01-752C-574E-48CB-DE7B4DFFC3F5}"/>
+              </a:ext>
+            </a:extLst>
+          </p:cNvPr>
+          <p:cNvSpPr txBox="1"/>
+          <p:nvPr/>
+        </p:nvSpPr>
+        <p:spPr>
+          <a:xfrm>
+            <a:off x="5501082" y="1789420"/>
+            <a:ext cx="1098957" cy="261610"/>
+          </a:xfrm>
+          <a:prstGeom prst="rect">
+            <a:avLst/>
+          </a:prstGeom>
+          <a:noFill/>
+        </p:spPr>
+        <p:txBody>
+          <a:bodyPr wrap="square" rtlCol="0">
+            <a:spAutoFit/>
+          </a:bodyPr>
+          <a:lstStyle/>
+          <a:p>
+            <a:r>
+              <a:rPr lang="en-US" sz="1100" dirty="0"/>
+              <a:t>Port: 8004</a:t>
+            </a:r>
+            <a:endParaRPr lang="ru-RU" sz="1100" dirty="0"/>
+          </a:p>
+        </p:txBody>
+      </p:sp>
+      <p:sp>
+        <p:nvSpPr>
+          <p:cNvPr id="21" name="TextBox 20">
+            <a:extLst>
+              <a:ext uri="{FF2B5EF4-FFF2-40B4-BE49-F238E27FC236}">
+                <a16:creationId xmlns:a16="http://schemas.microsoft.com/office/drawing/2014/main" id="{623F479A-333C-A379-92B3-707742369EEF}"/>
+              </a:ext>
+            </a:extLst>
+          </p:cNvPr>
+          <p:cNvSpPr txBox="1"/>
+          <p:nvPr/>
+        </p:nvSpPr>
+        <p:spPr>
+          <a:xfrm>
+            <a:off x="3177680" y="1781108"/>
+            <a:ext cx="1098957" cy="261610"/>
+          </a:xfrm>
+          <a:prstGeom prst="rect">
+            <a:avLst/>
+          </a:prstGeom>
+          <a:noFill/>
+        </p:spPr>
+        <p:txBody>
+          <a:bodyPr wrap="square" rtlCol="0">
+            <a:spAutoFit/>
+          </a:bodyPr>
+          <a:lstStyle/>
+          <a:p>
+            <a:r>
+              <a:rPr lang="en-US" sz="1100" dirty="0"/>
+              <a:t>Port: 8005</a:t>
+            </a:r>
+            <a:endParaRPr lang="ru-RU" sz="1100" dirty="0"/>
+          </a:p>
+        </p:txBody>
+      </p:sp>
+      <p:sp>
+        <p:nvSpPr>
+          <p:cNvPr id="22" name="TextBox 21">
+            <a:extLst>
+              <a:ext uri="{FF2B5EF4-FFF2-40B4-BE49-F238E27FC236}">
+                <a16:creationId xmlns:a16="http://schemas.microsoft.com/office/drawing/2014/main" id="{7EF6689A-0821-2680-939C-D4DCC2A82089}"/>
+              </a:ext>
+            </a:extLst>
+          </p:cNvPr>
+          <p:cNvSpPr txBox="1"/>
+          <p:nvPr/>
+        </p:nvSpPr>
+        <p:spPr>
+          <a:xfrm>
+            <a:off x="5410554" y="3871362"/>
+            <a:ext cx="1098957" cy="261610"/>
+          </a:xfrm>
+          <a:prstGeom prst="rect">
+            <a:avLst/>
+          </a:prstGeom>
+          <a:noFill/>
+        </p:spPr>
+        <p:txBody>
+          <a:bodyPr wrap="square" rtlCol="0">
+            <a:spAutoFit/>
+          </a:bodyPr>
+          <a:lstStyle/>
+          <a:p>
+            <a:r>
+              <a:rPr lang="en-US" sz="1100" dirty="0"/>
+              <a:t>Port: 8080</a:t>
+            </a:r>
+            <a:endParaRPr lang="ru-RU" sz="1100" dirty="0"/>
           </a:p>
         </p:txBody>
       </p:sp>

</xml_diff>

<commit_message>
UserPortal google Oauth2 implemented
</commit_message>
<xml_diff>
--- a/Microservices_schema.pptx
+++ b/Microservices_schema.pptx
@@ -262,7 +262,7 @@
           <a:p>
             <a:fld id="{0F862E04-129F-4891-9605-C631F7CCB0C5}" type="datetimeFigureOut">
               <a:rPr lang="ru-RU" smtClean="0"/>
-              <a:t>18.07.2022</a:t>
+              <a:t>19.07.2022</a:t>
             </a:fld>
             <a:endParaRPr lang="ru-RU"/>
           </a:p>
@@ -462,7 +462,7 @@
           <a:p>
             <a:fld id="{0F862E04-129F-4891-9605-C631F7CCB0C5}" type="datetimeFigureOut">
               <a:rPr lang="ru-RU" smtClean="0"/>
-              <a:t>18.07.2022</a:t>
+              <a:t>19.07.2022</a:t>
             </a:fld>
             <a:endParaRPr lang="ru-RU"/>
           </a:p>
@@ -672,7 +672,7 @@
           <a:p>
             <a:fld id="{0F862E04-129F-4891-9605-C631F7CCB0C5}" type="datetimeFigureOut">
               <a:rPr lang="ru-RU" smtClean="0"/>
-              <a:t>18.07.2022</a:t>
+              <a:t>19.07.2022</a:t>
             </a:fld>
             <a:endParaRPr lang="ru-RU"/>
           </a:p>
@@ -872,7 +872,7 @@
           <a:p>
             <a:fld id="{0F862E04-129F-4891-9605-C631F7CCB0C5}" type="datetimeFigureOut">
               <a:rPr lang="ru-RU" smtClean="0"/>
-              <a:t>18.07.2022</a:t>
+              <a:t>19.07.2022</a:t>
             </a:fld>
             <a:endParaRPr lang="ru-RU"/>
           </a:p>
@@ -1148,7 +1148,7 @@
           <a:p>
             <a:fld id="{0F862E04-129F-4891-9605-C631F7CCB0C5}" type="datetimeFigureOut">
               <a:rPr lang="ru-RU" smtClean="0"/>
-              <a:t>18.07.2022</a:t>
+              <a:t>19.07.2022</a:t>
             </a:fld>
             <a:endParaRPr lang="ru-RU"/>
           </a:p>
@@ -1416,7 +1416,7 @@
           <a:p>
             <a:fld id="{0F862E04-129F-4891-9605-C631F7CCB0C5}" type="datetimeFigureOut">
               <a:rPr lang="ru-RU" smtClean="0"/>
-              <a:t>18.07.2022</a:t>
+              <a:t>19.07.2022</a:t>
             </a:fld>
             <a:endParaRPr lang="ru-RU"/>
           </a:p>
@@ -1831,7 +1831,7 @@
           <a:p>
             <a:fld id="{0F862E04-129F-4891-9605-C631F7CCB0C5}" type="datetimeFigureOut">
               <a:rPr lang="ru-RU" smtClean="0"/>
-              <a:t>18.07.2022</a:t>
+              <a:t>19.07.2022</a:t>
             </a:fld>
             <a:endParaRPr lang="ru-RU"/>
           </a:p>
@@ -1973,7 +1973,7 @@
           <a:p>
             <a:fld id="{0F862E04-129F-4891-9605-C631F7CCB0C5}" type="datetimeFigureOut">
               <a:rPr lang="ru-RU" smtClean="0"/>
-              <a:t>18.07.2022</a:t>
+              <a:t>19.07.2022</a:t>
             </a:fld>
             <a:endParaRPr lang="ru-RU"/>
           </a:p>
@@ -2086,7 +2086,7 @@
           <a:p>
             <a:fld id="{0F862E04-129F-4891-9605-C631F7CCB0C5}" type="datetimeFigureOut">
               <a:rPr lang="ru-RU" smtClean="0"/>
-              <a:t>18.07.2022</a:t>
+              <a:t>19.07.2022</a:t>
             </a:fld>
             <a:endParaRPr lang="ru-RU"/>
           </a:p>
@@ -2399,7 +2399,7 @@
           <a:p>
             <a:fld id="{0F862E04-129F-4891-9605-C631F7CCB0C5}" type="datetimeFigureOut">
               <a:rPr lang="ru-RU" smtClean="0"/>
-              <a:t>18.07.2022</a:t>
+              <a:t>19.07.2022</a:t>
             </a:fld>
             <a:endParaRPr lang="ru-RU"/>
           </a:p>
@@ -2688,7 +2688,7 @@
           <a:p>
             <a:fld id="{0F862E04-129F-4891-9605-C631F7CCB0C5}" type="datetimeFigureOut">
               <a:rPr lang="ru-RU" smtClean="0"/>
-              <a:t>18.07.2022</a:t>
+              <a:t>19.07.2022</a:t>
             </a:fld>
             <a:endParaRPr lang="ru-RU"/>
           </a:p>
@@ -2931,7 +2931,7 @@
           <a:p>
             <a:fld id="{0F862E04-129F-4891-9605-C631F7CCB0C5}" type="datetimeFigureOut">
               <a:rPr lang="ru-RU" smtClean="0"/>
-              <a:t>18.07.2022</a:t>
+              <a:t>19.07.2022</a:t>
             </a:fld>
             <a:endParaRPr lang="ru-RU"/>
           </a:p>
@@ -3780,7 +3780,7 @@
         <p:spPr>
           <a:xfrm>
             <a:off x="5206767" y="2899791"/>
-            <a:ext cx="1245765" cy="1233183"/>
+            <a:ext cx="1393272" cy="1233183"/>
           </a:xfrm>
           <a:prstGeom prst="rect">
             <a:avLst/>
@@ -3876,7 +3876,7 @@
         </p:nvSpPr>
         <p:spPr>
           <a:xfrm>
-            <a:off x="7370430" y="2899790"/>
+            <a:off x="7286539" y="3618906"/>
             <a:ext cx="1325461" cy="746621"/>
           </a:xfrm>
           <a:prstGeom prst="rect">
@@ -3904,7 +3904,7 @@
             <a:pPr algn="ctr"/>
             <a:r>
               <a:rPr lang="en-US" dirty="0"/>
-              <a:t>Account Service</a:t>
+              <a:t>User Service</a:t>
             </a:r>
             <a:endParaRPr lang="ru-RU" dirty="0"/>
           </a:p>
@@ -3924,7 +3924,7 @@
         </p:nvSpPr>
         <p:spPr>
           <a:xfrm>
-            <a:off x="9318773" y="3143071"/>
+            <a:off x="9234882" y="3604736"/>
             <a:ext cx="1090569" cy="746620"/>
           </a:xfrm>
           <a:prstGeom prst="can">
@@ -3975,7 +3975,7 @@
         </p:nvCxnSpPr>
         <p:spPr>
           <a:xfrm>
-            <a:off x="8695891" y="3516381"/>
+            <a:off x="8612000" y="3978046"/>
             <a:ext cx="622882" cy="0"/>
           </a:xfrm>
           <a:prstGeom prst="straightConnector1">
@@ -4015,8 +4015,8 @@
         </p:nvSpPr>
         <p:spPr>
           <a:xfrm>
-            <a:off x="7370430" y="3646411"/>
-            <a:ext cx="1325461" cy="486563"/>
+            <a:off x="5206767" y="4132972"/>
+            <a:ext cx="1393272" cy="486563"/>
           </a:xfrm>
           <a:prstGeom prst="rect">
             <a:avLst/>
@@ -4147,7 +4147,7 @@
         </p:nvSpPr>
         <p:spPr>
           <a:xfrm>
-            <a:off x="7704588" y="4164358"/>
+            <a:off x="7513043" y="4421376"/>
             <a:ext cx="1098957" cy="261610"/>
           </a:xfrm>
           <a:prstGeom prst="rect">
@@ -4277,6 +4277,138 @@
           </a:p>
         </p:txBody>
       </p:sp>
+      <p:sp>
+        <p:nvSpPr>
+          <p:cNvPr id="27" name="Rectangle 26">
+            <a:extLst>
+              <a:ext uri="{FF2B5EF4-FFF2-40B4-BE49-F238E27FC236}">
+                <a16:creationId xmlns:a16="http://schemas.microsoft.com/office/drawing/2014/main" id="{37755D04-0997-7BEF-263B-B68549F4380E}"/>
+              </a:ext>
+            </a:extLst>
+          </p:cNvPr>
+          <p:cNvSpPr/>
+          <p:nvPr/>
+        </p:nvSpPr>
+        <p:spPr>
+          <a:xfrm>
+            <a:off x="7286539" y="2723631"/>
+            <a:ext cx="1325461" cy="746621"/>
+          </a:xfrm>
+          <a:prstGeom prst="rect">
+            <a:avLst/>
+          </a:prstGeom>
+        </p:spPr>
+        <p:style>
+          <a:lnRef idx="2">
+            <a:schemeClr val="accent2"/>
+          </a:lnRef>
+          <a:fillRef idx="1">
+            <a:schemeClr val="lt1"/>
+          </a:fillRef>
+          <a:effectRef idx="0">
+            <a:schemeClr val="accent2"/>
+          </a:effectRef>
+          <a:fontRef idx="minor">
+            <a:schemeClr val="dk1"/>
+          </a:fontRef>
+        </p:style>
+        <p:txBody>
+          <a:bodyPr rtlCol="0" anchor="ctr"/>
+          <a:lstStyle/>
+          <a:p>
+            <a:pPr algn="ctr"/>
+            <a:r>
+              <a:rPr lang="en-US" dirty="0"/>
+              <a:t>Google login</a:t>
+            </a:r>
+            <a:endParaRPr lang="ru-RU" dirty="0"/>
+          </a:p>
+        </p:txBody>
+      </p:sp>
+      <p:cxnSp>
+        <p:nvCxnSpPr>
+          <p:cNvPr id="6" name="Straight Arrow Connector 5">
+            <a:extLst>
+              <a:ext uri="{FF2B5EF4-FFF2-40B4-BE49-F238E27FC236}">
+                <a16:creationId xmlns:a16="http://schemas.microsoft.com/office/drawing/2014/main" id="{5DE2CE56-72A3-EE18-F571-B71499F3B2BA}"/>
+              </a:ext>
+            </a:extLst>
+          </p:cNvPr>
+          <p:cNvCxnSpPr>
+            <a:stCxn id="18" idx="3"/>
+            <a:endCxn id="27" idx="1"/>
+          </p:cNvCxnSpPr>
+          <p:nvPr/>
+        </p:nvCxnSpPr>
+        <p:spPr>
+          <a:xfrm flipV="1">
+            <a:off x="6600039" y="3096942"/>
+            <a:ext cx="686500" cy="419441"/>
+          </a:xfrm>
+          <a:prstGeom prst="straightConnector1">
+            <a:avLst/>
+          </a:prstGeom>
+          <a:ln>
+            <a:tailEnd type="triangle"/>
+          </a:ln>
+        </p:spPr>
+        <p:style>
+          <a:lnRef idx="1">
+            <a:schemeClr val="accent1"/>
+          </a:lnRef>
+          <a:fillRef idx="0">
+            <a:schemeClr val="accent1"/>
+          </a:fillRef>
+          <a:effectRef idx="0">
+            <a:schemeClr val="accent1"/>
+          </a:effectRef>
+          <a:fontRef idx="minor">
+            <a:schemeClr val="tx1"/>
+          </a:fontRef>
+        </p:style>
+      </p:cxnSp>
+      <p:cxnSp>
+        <p:nvCxnSpPr>
+          <p:cNvPr id="12" name="Straight Arrow Connector 11">
+            <a:extLst>
+              <a:ext uri="{FF2B5EF4-FFF2-40B4-BE49-F238E27FC236}">
+                <a16:creationId xmlns:a16="http://schemas.microsoft.com/office/drawing/2014/main" id="{0C62AD6B-14A7-1ACC-8AA1-0EF54D0F9A9D}"/>
+              </a:ext>
+            </a:extLst>
+          </p:cNvPr>
+          <p:cNvCxnSpPr>
+            <a:stCxn id="18" idx="3"/>
+            <a:endCxn id="24" idx="1"/>
+          </p:cNvCxnSpPr>
+          <p:nvPr/>
+        </p:nvCxnSpPr>
+        <p:spPr>
+          <a:xfrm>
+            <a:off x="6600039" y="3516383"/>
+            <a:ext cx="686500" cy="475834"/>
+          </a:xfrm>
+          <a:prstGeom prst="straightConnector1">
+            <a:avLst/>
+          </a:prstGeom>
+          <a:ln>
+            <a:tailEnd type="triangle"/>
+          </a:ln>
+        </p:spPr>
+        <p:style>
+          <a:lnRef idx="1">
+            <a:schemeClr val="accent1"/>
+          </a:lnRef>
+          <a:fillRef idx="0">
+            <a:schemeClr val="accent1"/>
+          </a:fillRef>
+          <a:effectRef idx="0">
+            <a:schemeClr val="accent1"/>
+          </a:effectRef>
+          <a:fontRef idx="minor">
+            <a:schemeClr val="tx1"/>
+          </a:fontRef>
+        </p:style>
+      </p:cxnSp>
     </p:spTree>
     <p:extLst>
       <p:ext uri="{BB962C8B-B14F-4D97-AF65-F5344CB8AC3E}">

</xml_diff>